<commit_message>
Updated PPT Cleaned up API code to follow PEP8
</commit_message>
<xml_diff>
--- a/docs/Projet 6 - C. Muths - Traitement langage naturel.pptx
+++ b/docs/Projet 6 - C. Muths - Traitement langage naturel.pptx
@@ -5377,8 +5377,8 @@
           </a:p>
         </p:txBody>
       </p:sp>
-      <mc:AlternateContent xmlns:mc="http://schemas.openxmlformats.org/markup-compatibility/2006">
-        <mc:Choice xmlns:a14="http://schemas.microsoft.com/office/drawing/2010/main" Requires="a14">
+      <mc:AlternateContent xmlns:mc="http://schemas.openxmlformats.org/markup-compatibility/2006" xmlns:a14="http://schemas.microsoft.com/office/drawing/2010/main">
+        <mc:Choice Requires="a14">
           <p:sp>
             <p:nvSpPr>
               <p:cNvPr id="3" name="Espace réservé du contenu 2">
@@ -5976,7 +5976,7 @@
             </p:txBody>
           </p:sp>
         </mc:Choice>
-        <mc:Fallback>
+        <mc:Fallback xmlns="">
           <p:sp>
             <p:nvSpPr>
               <p:cNvPr id="3" name="Espace réservé du contenu 2">
@@ -7989,7 +7989,7 @@
             <a:pPr lvl="1"/>
             <a:r>
               <a:rPr lang="fr-FR" dirty="0"/>
-              <a:t>L’implémentation utilise un POST sur un point d’accès, avec passage des contenus par éléments de formulaire. Cela évite de passer les données par l’URL, susceptible de créer des problèmes avec les caractères spéciaux.</a:t>
+              <a:t>L’implémentation utilise un POST sur un point d’accès, avec passage des contenus par éléments de formulaire.</a:t>
             </a:r>
           </a:p>
           <a:p>
@@ -8001,13 +8001,8 @@
           <a:p>
             <a:r>
               <a:rPr lang="fr-FR" dirty="0"/>
-              <a:t>Elle retourne en sortie une liste de 10 tags parmi lesquels l’utilisateur est invité à faire </a:t>
-            </a:r>
-            <a:r>
-              <a:rPr lang="fr-FR"/>
-              <a:t>son choix.</a:t>
-            </a:r>
-            <a:endParaRPr lang="fr-FR" dirty="0"/>
+              <a:t>Elle retourne en sortie une liste de 10 tags parmi lesquels l’utilisateur est invité à faire son choix.</a:t>
+            </a:r>
           </a:p>
           <a:p>
             <a:endParaRPr lang="fr-FR" dirty="0"/>
@@ -8227,7 +8222,39 @@
           <a:p>
             <a:r>
               <a:rPr lang="fr-FR" dirty="0"/>
-              <a:t>Non disponible</a:t>
+              <a:t>Le formulaire permettant de saisir une question est disponible à l’adresse</a:t>
+            </a:r>
+            <a:br>
+              <a:rPr lang="fr-FR" dirty="0"/>
+            </a:br>
+            <a:r>
+              <a:rPr lang="fr-FR" dirty="0">
+                <a:hlinkClick r:id="rId2"/>
+              </a:rPr>
+              <a:t>http://muths.pythonanywhere.com/p6/input/</a:t>
+            </a:r>
+            <a:r>
+              <a:rPr lang="fr-FR" dirty="0"/>
+              <a:t> </a:t>
+            </a:r>
+          </a:p>
+          <a:p>
+            <a:endParaRPr lang="fr-FR" dirty="0"/>
+          </a:p>
+          <a:p>
+            <a:r>
+              <a:rPr lang="fr-FR" dirty="0"/>
+              <a:t>Ce formulaire appelle la page </a:t>
+            </a:r>
+            <a:r>
+              <a:rPr lang="fr-FR" dirty="0">
+                <a:hlinkClick r:id="rId3"/>
+              </a:rPr>
+              <a:t>http://muths.pythonanywhere.com/p6/tag_reco</a:t>
+            </a:r>
+            <a:r>
+              <a:rPr lang="fr-FR" dirty="0"/>
+              <a:t> en lui passant le titre et le corps de la question et propose en retour une liste de 10 tags.</a:t>
             </a:r>
           </a:p>
         </p:txBody>
@@ -11200,17 +11227,12 @@
 </file>
 
 <file path=customXml/item1.xml><?xml version="1.0" encoding="utf-8"?>
-<p:properties xmlns:p="http://schemas.microsoft.com/office/2006/metadata/properties" xmlns:xsi="http://www.w3.org/2001/XMLSchema-instance" xmlns:pc="http://schemas.microsoft.com/office/infopath/2007/PartnerControls">
-  <documentManagement>
-    <SharedWithUsers xmlns="748099ad-2d26-4e61-9061-59d3c097668b">
-      <UserInfo>
-        <DisplayName>Vallier Joel</DisplayName>
-        <AccountId>257</AccountId>
-        <AccountType/>
-      </UserInfo>
-    </SharedWithUsers>
-  </documentManagement>
-</p:properties>
+<?mso-contentType ?>
+<FormTemplates xmlns="http://schemas.microsoft.com/sharepoint/v3/contenttype/forms">
+  <Display>DocumentLibraryForm</Display>
+  <Edit>DocumentLibraryForm</Edit>
+  <New>DocumentLibraryForm</New>
+</FormTemplates>
 </file>
 
 <file path=customXml/item2.xml><?xml version="1.0" encoding="utf-8"?>
@@ -11379,27 +11401,23 @@
 </file>
 
 <file path=customXml/item3.xml><?xml version="1.0" encoding="utf-8"?>
-<?mso-contentType ?>
-<FormTemplates xmlns="http://schemas.microsoft.com/sharepoint/v3/contenttype/forms">
-  <Display>DocumentLibraryForm</Display>
-  <Edit>DocumentLibraryForm</Edit>
-  <New>DocumentLibraryForm</New>
-</FormTemplates>
+<p:properties xmlns:p="http://schemas.microsoft.com/office/2006/metadata/properties" xmlns:xsi="http://www.w3.org/2001/XMLSchema-instance" xmlns:pc="http://schemas.microsoft.com/office/infopath/2007/PartnerControls">
+  <documentManagement>
+    <SharedWithUsers xmlns="748099ad-2d26-4e61-9061-59d3c097668b">
+      <UserInfo>
+        <DisplayName>Vallier Joel</DisplayName>
+        <AccountId>257</AccountId>
+        <AccountType/>
+      </UserInfo>
+    </SharedWithUsers>
+  </documentManagement>
+</p:properties>
 </file>
 
 <file path=customXml/itemProps1.xml><?xml version="1.0" encoding="utf-8"?>
-<ds:datastoreItem xmlns:ds="http://schemas.openxmlformats.org/officeDocument/2006/customXml" ds:itemID="{2E0D8ABF-D62B-43C1-8CD5-8FDE6B705449}">
+<ds:datastoreItem xmlns:ds="http://schemas.openxmlformats.org/officeDocument/2006/customXml" ds:itemID="{39C1D1BA-6728-4495-AD47-2EC15D871705}">
   <ds:schemaRefs>
-    <ds:schemaRef ds:uri="242081e3-def4-49db-957a-142271ec8b9e"/>
-    <ds:schemaRef ds:uri="http://purl.org/dc/dcmitype/"/>
-    <ds:schemaRef ds:uri="http://purl.org/dc/elements/1.1/"/>
-    <ds:schemaRef ds:uri="http://www.w3.org/XML/1998/namespace"/>
-    <ds:schemaRef ds:uri="748099ad-2d26-4e61-9061-59d3c097668b"/>
-    <ds:schemaRef ds:uri="http://purl.org/dc/terms/"/>
-    <ds:schemaRef ds:uri="http://schemas.openxmlformats.org/package/2006/metadata/core-properties"/>
-    <ds:schemaRef ds:uri="http://schemas.microsoft.com/office/2006/documentManagement/types"/>
-    <ds:schemaRef ds:uri="http://schemas.microsoft.com/office/infopath/2007/PartnerControls"/>
-    <ds:schemaRef ds:uri="http://schemas.microsoft.com/office/2006/metadata/properties"/>
+    <ds:schemaRef ds:uri="http://schemas.microsoft.com/sharepoint/v3/contenttype/forms"/>
   </ds:schemaRefs>
 </ds:datastoreItem>
 </file>
@@ -11424,9 +11442,18 @@
 </file>
 
 <file path=customXml/itemProps3.xml><?xml version="1.0" encoding="utf-8"?>
-<ds:datastoreItem xmlns:ds="http://schemas.openxmlformats.org/officeDocument/2006/customXml" ds:itemID="{39C1D1BA-6728-4495-AD47-2EC15D871705}">
+<ds:datastoreItem xmlns:ds="http://schemas.openxmlformats.org/officeDocument/2006/customXml" ds:itemID="{2E0D8ABF-D62B-43C1-8CD5-8FDE6B705449}">
   <ds:schemaRefs>
-    <ds:schemaRef ds:uri="http://schemas.microsoft.com/sharepoint/v3/contenttype/forms"/>
+    <ds:schemaRef ds:uri="242081e3-def4-49db-957a-142271ec8b9e"/>
+    <ds:schemaRef ds:uri="http://purl.org/dc/dcmitype/"/>
+    <ds:schemaRef ds:uri="http://purl.org/dc/elements/1.1/"/>
+    <ds:schemaRef ds:uri="http://www.w3.org/XML/1998/namespace"/>
+    <ds:schemaRef ds:uri="748099ad-2d26-4e61-9061-59d3c097668b"/>
+    <ds:schemaRef ds:uri="http://purl.org/dc/terms/"/>
+    <ds:schemaRef ds:uri="http://schemas.openxmlformats.org/package/2006/metadata/core-properties"/>
+    <ds:schemaRef ds:uri="http://schemas.microsoft.com/office/2006/documentManagement/types"/>
+    <ds:schemaRef ds:uri="http://schemas.microsoft.com/office/infopath/2007/PartnerControls"/>
+    <ds:schemaRef ds:uri="http://schemas.microsoft.com/office/2006/metadata/properties"/>
   </ds:schemaRefs>
 </ds:datastoreItem>
 </file>

</xml_diff>

<commit_message>
Putting in bold tags having more than 50% probability. Updating documentation
</commit_message>
<xml_diff>
--- a/docs/Projet 6 - C. Muths - Traitement langage naturel.pptx
+++ b/docs/Projet 6 - C. Muths - Traitement langage naturel.pptx
@@ -5,7 +5,7 @@
     <p:sldMasterId id="2147483648" r:id="rId4"/>
   </p:sldMasterIdLst>
   <p:notesMasterIdLst>
-    <p:notesMasterId r:id="rId26"/>
+    <p:notesMasterId r:id="rId28"/>
   </p:notesMasterIdLst>
   <p:sldIdLst>
     <p:sldId id="365" r:id="rId5"/>
@@ -18,17 +18,19 @@
     <p:sldId id="389" r:id="rId12"/>
     <p:sldId id="390" r:id="rId13"/>
     <p:sldId id="391" r:id="rId14"/>
-    <p:sldId id="395" r:id="rId15"/>
-    <p:sldId id="394" r:id="rId16"/>
-    <p:sldId id="392" r:id="rId17"/>
-    <p:sldId id="393" r:id="rId18"/>
-    <p:sldId id="397" r:id="rId19"/>
-    <p:sldId id="400" r:id="rId20"/>
-    <p:sldId id="402" r:id="rId21"/>
-    <p:sldId id="401" r:id="rId22"/>
-    <p:sldId id="398" r:id="rId23"/>
-    <p:sldId id="399" r:id="rId24"/>
-    <p:sldId id="287" r:id="rId25"/>
+    <p:sldId id="404" r:id="rId15"/>
+    <p:sldId id="395" r:id="rId16"/>
+    <p:sldId id="394" r:id="rId17"/>
+    <p:sldId id="392" r:id="rId18"/>
+    <p:sldId id="393" r:id="rId19"/>
+    <p:sldId id="397" r:id="rId20"/>
+    <p:sldId id="400" r:id="rId21"/>
+    <p:sldId id="402" r:id="rId22"/>
+    <p:sldId id="401" r:id="rId23"/>
+    <p:sldId id="403" r:id="rId24"/>
+    <p:sldId id="398" r:id="rId25"/>
+    <p:sldId id="399" r:id="rId26"/>
+    <p:sldId id="287" r:id="rId27"/>
   </p:sldIdLst>
   <p:sldSz cx="11887200" cy="6858000"/>
   <p:notesSz cx="9931400" cy="14351000"/>
@@ -3954,15 +3956,7 @@
           <a:p>
             <a:r>
               <a:rPr lang="en-US" dirty="0"/>
-              <a:t>22 </a:t>
-            </a:r>
-            <a:r>
-              <a:rPr lang="en-US" dirty="0" err="1"/>
-              <a:t>mai</a:t>
-            </a:r>
-            <a:r>
-              <a:rPr lang="en-US" dirty="0"/>
-              <a:t> 2018</a:t>
+              <a:t>1er juin2018</a:t>
             </a:r>
             <a:endParaRPr lang="en-US" dirty="0">
               <a:solidFill>
@@ -5347,6 +5341,126 @@
           <p:cNvPr id="2" name="Titre 1">
             <a:extLst>
               <a:ext uri="{FF2B5EF4-FFF2-40B4-BE49-F238E27FC236}">
+                <a16:creationId xmlns:a16="http://schemas.microsoft.com/office/drawing/2014/main" id="{9C8A5C33-91FE-4D64-B5AC-B31EA2303EC9}"/>
+              </a:ext>
+            </a:extLst>
+          </p:cNvPr>
+          <p:cNvSpPr>
+            <a:spLocks noGrp="1"/>
+          </p:cNvSpPr>
+          <p:nvPr>
+            <p:ph type="title"/>
+          </p:nvPr>
+        </p:nvSpPr>
+        <p:spPr/>
+        <p:txBody>
+          <a:bodyPr/>
+          <a:lstStyle/>
+          <a:p>
+            <a:r>
+              <a:rPr lang="fr-FR" dirty="0"/>
+              <a:t>Lien entre les topics et les tags</a:t>
+            </a:r>
+          </a:p>
+        </p:txBody>
+      </p:sp>
+      <p:sp>
+        <p:nvSpPr>
+          <p:cNvPr id="3" name="Espace réservé du contenu 2">
+            <a:extLst>
+              <a:ext uri="{FF2B5EF4-FFF2-40B4-BE49-F238E27FC236}">
+                <a16:creationId xmlns:a16="http://schemas.microsoft.com/office/drawing/2014/main" id="{BD6D1DA3-E3B0-4E4E-BDB4-9A0A00DBEF5D}"/>
+              </a:ext>
+            </a:extLst>
+          </p:cNvPr>
+          <p:cNvSpPr>
+            <a:spLocks noGrp="1"/>
+          </p:cNvSpPr>
+          <p:nvPr>
+            <p:ph idx="1"/>
+          </p:nvPr>
+        </p:nvSpPr>
+        <p:spPr/>
+        <p:txBody>
+          <a:bodyPr/>
+          <a:lstStyle/>
+          <a:p>
+            <a:r>
+              <a:rPr lang="fr-FR" dirty="0"/>
+              <a:t>Une approche supervisée a été utilisée pour trouver les tags relatifs à chaque topic. Cette approche est détaillée par la suite. Elle permet de relier les nouvelles questions à un ensemble de tags existants.</a:t>
+            </a:r>
+          </a:p>
+          <a:p>
+            <a:r>
+              <a:rPr lang="fr-FR" dirty="0"/>
+              <a:t>Une approche non supervisée aurait permis d’extraire les tags directement des topics.</a:t>
+            </a:r>
+          </a:p>
+          <a:p>
+            <a:pPr lvl="1"/>
+            <a:r>
+              <a:rPr lang="fr-FR" dirty="0"/>
+              <a:t>Il aurait fallu dans ce cas conserver des mots entiers et non des racines</a:t>
+            </a:r>
+          </a:p>
+          <a:p>
+            <a:pPr lvl="1"/>
+            <a:r>
+              <a:rPr lang="fr-FR" dirty="0"/>
+              <a:t>A partir de la probabilité d’appartenance d’une nouvelle question aux topics, proposer les mots les plus fréquents des topics les plus probables pour cette nouvelle question.</a:t>
+            </a:r>
+          </a:p>
+          <a:p>
+            <a:pPr lvl="1"/>
+            <a:r>
+              <a:rPr lang="fr-FR" dirty="0"/>
+              <a:t>L’inconvénient majeur de cette approche est la difficulté d’en évaluer la performance. Pas de calcul possible pour la comparer à l’existant.</a:t>
+            </a:r>
+          </a:p>
+          <a:p>
+            <a:pPr lvl="1"/>
+            <a:r>
+              <a:rPr lang="fr-FR" dirty="0"/>
+              <a:t>Un avantage est qu’il peut proposer des tags nouveaux, ne faisant pas partie de l’ensemble des existants.</a:t>
+            </a:r>
+          </a:p>
+        </p:txBody>
+      </p:sp>
+    </p:spTree>
+    <p:extLst>
+      <p:ext uri="{BB962C8B-B14F-4D97-AF65-F5344CB8AC3E}">
+        <p14:creationId xmlns:p14="http://schemas.microsoft.com/office/powerpoint/2010/main" val="2725187588"/>
+      </p:ext>
+    </p:extLst>
+  </p:cSld>
+  <p:clrMapOvr>
+    <a:masterClrMapping/>
+  </p:clrMapOvr>
+</p:sld>
+</file>
+
+<file path=ppt/slides/slide12.xml><?xml version="1.0" encoding="utf-8"?>
+<p:sld xmlns:a="http://schemas.openxmlformats.org/drawingml/2006/main" xmlns:r="http://schemas.openxmlformats.org/officeDocument/2006/relationships" xmlns:p="http://schemas.openxmlformats.org/presentationml/2006/main">
+  <p:cSld>
+    <p:spTree>
+      <p:nvGrpSpPr>
+        <p:cNvPr id="1" name=""/>
+        <p:cNvGrpSpPr/>
+        <p:nvPr/>
+      </p:nvGrpSpPr>
+      <p:grpSpPr>
+        <a:xfrm>
+          <a:off x="0" y="0"/>
+          <a:ext cx="0" cy="0"/>
+          <a:chOff x="0" y="0"/>
+          <a:chExt cx="0" cy="0"/>
+        </a:xfrm>
+      </p:grpSpPr>
+      <p:sp>
+        <p:nvSpPr>
+          <p:cNvPr id="2" name="Titre 1">
+            <a:extLst>
+              <a:ext uri="{FF2B5EF4-FFF2-40B4-BE49-F238E27FC236}">
                 <a16:creationId xmlns:a16="http://schemas.microsoft.com/office/drawing/2014/main" id="{D2DFBE39-1990-4FAC-83D2-8AA1A41DAE8C}"/>
               </a:ext>
             </a:extLst>
@@ -5377,8 +5491,8 @@
           </a:p>
         </p:txBody>
       </p:sp>
-      <mc:AlternateContent xmlns:mc="http://schemas.openxmlformats.org/markup-compatibility/2006" xmlns:a14="http://schemas.microsoft.com/office/drawing/2010/main">
-        <mc:Choice Requires="a14">
+      <mc:AlternateContent xmlns:mc="http://schemas.openxmlformats.org/markup-compatibility/2006">
+        <mc:Choice xmlns:a14="http://schemas.microsoft.com/office/drawing/2010/main" Requires="a14">
           <p:sp>
             <p:nvSpPr>
               <p:cNvPr id="3" name="Espace réservé du contenu 2">
@@ -5402,7 +5516,7 @@
               <a:p>
                 <a:r>
                   <a:rPr lang="fr-FR" dirty="0"/>
-                  <a:t>Pour obtenir une liste de tags associés à chaque topic la matrice des probabilités question &lt;-&gt; topic est multipliée par la matrice des topics &lt;-&gt; tags. </a:t>
+                  <a:t>Pour obtenir une liste de tags associés à chaque topic la matrice des probabilités questions &lt;-&gt; topics est multipliée par la matrice binaire des topics &lt;-&gt; tags. </a:t>
                 </a:r>
                 <a:br>
                   <a:rPr lang="fr-FR" dirty="0"/>
@@ -5937,30 +6051,22 @@
                   </a:spcBef>
                   <a:buNone/>
                   <a:tabLst>
-                    <a:tab pos="3670300" algn="ctr"/>
-                    <a:tab pos="5834063" algn="ctr"/>
+                    <a:tab pos="3851275" algn="ctr"/>
+                    <a:tab pos="6181725" algn="ctr"/>
                     <a:tab pos="8255000" algn="ctr"/>
                   </a:tabLst>
                 </a:pPr>
                 <a:r>
+                  <a:rPr lang="en-US" dirty="0"/>
+                  <a:t>questions-topics </a:t>
+                </a:r>
+                <a:r>
                   <a:rPr lang="en-US" dirty="0" err="1"/>
-                  <a:t>lda_corpus.T</a:t>
+                  <a:t>proba</a:t>
                 </a:r>
                 <a:r>
                   <a:rPr lang="en-US" dirty="0"/>
-                  <a:t>	</a:t>
-                </a:r>
-                <a:r>
-                  <a:rPr lang="en-US" dirty="0" err="1"/>
-                  <a:t>tag_matrix</a:t>
-                </a:r>
-                <a:r>
-                  <a:rPr lang="en-US" dirty="0"/>
-                  <a:t>	</a:t>
-                </a:r>
-                <a:r>
-                  <a:rPr lang="en-US" dirty="0" err="1"/>
-                  <a:t>topic_tag_weight</a:t>
+                  <a:t>	topics-tags	topic-tag weight</a:t>
                 </a:r>
                 <a:endParaRPr lang="fr-FR" dirty="0"/>
               </a:p>
@@ -5970,13 +6076,13 @@
               <a:p>
                 <a:r>
                   <a:rPr lang="fr-FR" dirty="0"/>
-                  <a:t>Le poids peut être supérieur à 1 si le mot est utilisé plusieurs fois dans un topic.</a:t>
+                  <a:t>Le poids peut être supérieur à 1 si le mot est utilisé plusieurs fois dans un topic, ce qui est souvent le cas.</a:t>
                 </a:r>
               </a:p>
             </p:txBody>
           </p:sp>
         </mc:Choice>
-        <mc:Fallback xmlns="">
+        <mc:Fallback>
           <p:sp>
             <p:nvSpPr>
               <p:cNvPr id="3" name="Espace réservé du contenu 2">
@@ -5997,7 +6103,7 @@
               <a:blipFill>
                 <a:blip r:embed="rId2"/>
                 <a:stretch>
-                  <a:fillRect l="-864" t="-1750" b="-4307"/>
+                  <a:fillRect l="-864" t="-1750" b="-11036"/>
                 </a:stretch>
               </a:blipFill>
             </p:spPr>
@@ -6029,7 +6135,7 @@
 </p:sld>
 </file>
 
-<file path=ppt/slides/slide12.xml><?xml version="1.0" encoding="utf-8"?>
+<file path=ppt/slides/slide13.xml><?xml version="1.0" encoding="utf-8"?>
 <p:sld xmlns:a="http://schemas.openxmlformats.org/drawingml/2006/main" xmlns:r="http://schemas.openxmlformats.org/officeDocument/2006/relationships" xmlns:p="http://schemas.openxmlformats.org/presentationml/2006/main">
   <p:cSld>
     <p:spTree>
@@ -6104,7 +6210,7 @@
           <a:p>
             <a:r>
               <a:rPr lang="fr-FR" dirty="0"/>
-              <a:t>Les nouvelles questions passent par le même traitement initial utilisé pour le jeu d’entraînement pour extraire les racines de mots.</a:t>
+              <a:t>Les nouvelles questions passent par le même traitement initial que celui utilisé pour le jeu d’entraînement pour extraire les racines de mots.</a:t>
             </a:r>
           </a:p>
           <a:p>
@@ -6148,7 +6254,7 @@
 </p:sld>
 </file>
 
-<file path=ppt/slides/slide13.xml><?xml version="1.0" encoding="utf-8"?>
+<file path=ppt/slides/slide14.xml><?xml version="1.0" encoding="utf-8"?>
 <p:sld xmlns:a="http://schemas.openxmlformats.org/drawingml/2006/main" xmlns:r="http://schemas.openxmlformats.org/officeDocument/2006/relationships" xmlns:p="http://schemas.openxmlformats.org/presentationml/2006/main">
   <p:cSld>
     <p:spTree>
@@ -6294,7 +6400,7 @@
 </p:sld>
 </file>
 
-<file path=ppt/slides/slide14.xml><?xml version="1.0" encoding="utf-8"?>
+<file path=ppt/slides/slide15.xml><?xml version="1.0" encoding="utf-8"?>
 <p:sld xmlns:a="http://schemas.openxmlformats.org/drawingml/2006/main" xmlns:r="http://schemas.openxmlformats.org/officeDocument/2006/relationships" xmlns:p="http://schemas.openxmlformats.org/presentationml/2006/main">
   <p:cSld>
     <p:spTree>
@@ -6336,6 +6442,13 @@
               <a:rPr lang="fr-FR" dirty="0"/>
               <a:t>Méthode supervisée</a:t>
             </a:r>
+            <a:br>
+              <a:rPr lang="fr-FR" dirty="0"/>
+            </a:br>
+            <a:r>
+              <a:rPr lang="fr-FR" dirty="0"/>
+              <a:t>SVM Multi-labels</a:t>
+            </a:r>
           </a:p>
         </p:txBody>
       </p:sp>
@@ -6362,26 +6475,26 @@
           <a:p>
             <a:r>
               <a:rPr lang="fr-FR" dirty="0"/>
-              <a:t>Cette méthode utilise en entrée la même matrice de racines de mots que la méthode non supervisée.</a:t>
-            </a:r>
-          </a:p>
-          <a:p>
-            <a:r>
-              <a:rPr lang="fr-FR" dirty="0"/>
-              <a:t>Les étiquettes à prédire sont les tags.</a:t>
-            </a:r>
-          </a:p>
-          <a:p>
-            <a:r>
-              <a:rPr lang="fr-FR" dirty="0"/>
-              <a:t>Un classifieur SVM multi-classes est utilisé. Ce classifieur donne pour chaque observation, une probabilité de pertinence d’étiquette.</a:t>
+              <a:t>Cette méthode utilise en entrée (X) la même matrice de racines de mots que la méthode non supervisée.</a:t>
+            </a:r>
+          </a:p>
+          <a:p>
+            <a:r>
+              <a:rPr lang="fr-FR" dirty="0"/>
+              <a:t>Les étiquettes à prédire (Y) sont les tags.</a:t>
+            </a:r>
+          </a:p>
+          <a:p>
+            <a:r>
+              <a:rPr lang="fr-FR" dirty="0"/>
+              <a:t>Un classifieur SVM multi-labels est utilisé. Ce classifieur donne pour chaque observation, une probabilité d’appartenance d’une question à un tag.</a:t>
             </a:r>
           </a:p>
           <a:p>
             <a:pPr lvl="1"/>
             <a:r>
               <a:rPr lang="fr-FR" dirty="0"/>
-              <a:t>Cette méthode ne permet pas d’obtenir de liste de topics.</a:t>
+              <a:t>A noter que cette méthode ne permet pas d’obtenir de liste de topics.</a:t>
             </a:r>
           </a:p>
           <a:p>
@@ -6393,7 +6506,7 @@
           <a:p>
             <a:r>
               <a:rPr lang="fr-FR" dirty="0"/>
-              <a:t>Les 5 ou 10 tags ayant la probabilité la plus élevée sont proposés.</a:t>
+              <a:t>Les 5 tags ayant la probabilité la plus élevée sont proposés.</a:t>
             </a:r>
           </a:p>
           <a:p>
@@ -6407,7 +6520,15 @@
             </a:r>
             <a:r>
               <a:rPr lang="fr-FR" dirty="0"/>
-              <a:t> en plus des monogrammes permet d’augmenter la performance.</a:t>
+              <a:t> en plus des </a:t>
+            </a:r>
+            <a:r>
+              <a:rPr lang="fr-FR" dirty="0" err="1"/>
+              <a:t>unigrammes</a:t>
+            </a:r>
+            <a:r>
+              <a:rPr lang="fr-FR" dirty="0"/>
+              <a:t> permet d’augmenter la performance.</a:t>
             </a:r>
           </a:p>
         </p:txBody>
@@ -6425,7 +6546,7 @@
 </p:sld>
 </file>
 
-<file path=ppt/slides/slide15.xml><?xml version="1.0" encoding="utf-8"?>
+<file path=ppt/slides/slide16.xml><?xml version="1.0" encoding="utf-8"?>
 <p:sld xmlns:a="http://schemas.openxmlformats.org/drawingml/2006/main" xmlns:r="http://schemas.openxmlformats.org/officeDocument/2006/relationships" xmlns:p="http://schemas.openxmlformats.org/presentationml/2006/main">
   <p:cSld>
     <p:spTree>
@@ -6826,7 +6947,7 @@
         </p:nvSpPr>
         <p:spPr>
           <a:xfrm>
-            <a:off x="233005" y="966985"/>
+            <a:off x="233005" y="1005622"/>
             <a:ext cx="11301770" cy="369332"/>
           </a:xfrm>
           <a:prstGeom prst="rect">
@@ -6860,7 +6981,7 @@
 </p:sld>
 </file>
 
-<file path=ppt/slides/slide16.xml><?xml version="1.0" encoding="utf-8"?>
+<file path=ppt/slides/slide17.xml><?xml version="1.0" encoding="utf-8"?>
 <p:sld xmlns:a="http://schemas.openxmlformats.org/drawingml/2006/main" xmlns:r="http://schemas.openxmlformats.org/officeDocument/2006/relationships" xmlns:p="http://schemas.openxmlformats.org/presentationml/2006/main">
   <p:cSld>
     <p:spTree>
@@ -6957,7 +7078,15 @@
             </a:r>
             <a:r>
               <a:rPr lang="fr-FR" dirty="0"/>
-              <a:t> au lieu de monogrammes n’apporte pas d’amélioration</a:t>
+              <a:t> en plus des </a:t>
+            </a:r>
+            <a:r>
+              <a:rPr lang="fr-FR" dirty="0" err="1"/>
+              <a:t>unigrammes</a:t>
+            </a:r>
+            <a:r>
+              <a:rPr lang="fr-FR" dirty="0"/>
+              <a:t> n’apporte pas d’amélioration</a:t>
             </a:r>
           </a:p>
           <a:p>
@@ -6988,7 +7117,7 @@
           <p:nvPr>
             <p:extLst>
               <p:ext uri="{D42A27DB-BD31-4B8C-83A1-F6EECF244321}">
-                <p14:modId xmlns:p14="http://schemas.microsoft.com/office/powerpoint/2010/main" val="1746822245"/>
+                <p14:modId xmlns:p14="http://schemas.microsoft.com/office/powerpoint/2010/main" val="751656252"/>
               </p:ext>
             </p:extLst>
           </p:nvPr>
@@ -7076,8 +7205,12 @@
                     <a:lstStyle/>
                     <a:p>
                       <a:r>
+                        <a:rPr lang="fr-FR" dirty="0" err="1"/>
+                        <a:t>unigrammes</a:t>
+                      </a:r>
+                      <a:r>
                         <a:rPr lang="fr-FR" dirty="0"/>
-                        <a:t>Monogrammes, 15 topics, sans normalisation</a:t>
+                        <a:t>, 15 topics, sans normalisation</a:t>
                       </a:r>
                     </a:p>
                   </a:txBody>
@@ -7139,8 +7272,12 @@
                         <a:defRPr/>
                       </a:pPr>
                       <a:r>
+                        <a:rPr lang="fr-FR" dirty="0" err="1"/>
+                        <a:t>unigrammes</a:t>
+                      </a:r>
+                      <a:r>
                         <a:rPr lang="fr-FR" dirty="0"/>
-                        <a:t>Monogrammes, sans normalisation</a:t>
+                        <a:t>, sans normalisation</a:t>
                       </a:r>
                     </a:p>
                   </a:txBody>
@@ -7185,8 +7322,12 @@
                     <a:lstStyle/>
                     <a:p>
                       <a:r>
+                        <a:rPr lang="fr-FR" dirty="0" err="1"/>
+                        <a:t>unigrammes</a:t>
+                      </a:r>
+                      <a:r>
                         <a:rPr lang="fr-FR" dirty="0"/>
-                        <a:t>Monogrammes, avec normalisation</a:t>
+                        <a:t>, avec normalisation</a:t>
                       </a:r>
                     </a:p>
                   </a:txBody>
@@ -7232,7 +7373,7 @@
                     <a:p>
                       <a:r>
                         <a:rPr lang="fr-FR" dirty="0" err="1"/>
-                        <a:t>Bigrammes</a:t>
+                        <a:t>bigrammes</a:t>
                       </a:r>
                       <a:r>
                         <a:rPr lang="fr-FR" dirty="0"/>
@@ -7282,7 +7423,7 @@
                     <a:p>
                       <a:r>
                         <a:rPr lang="fr-FR" dirty="0" err="1"/>
-                        <a:t>Bigrammes</a:t>
+                        <a:t>bigrammes</a:t>
                       </a:r>
                       <a:r>
                         <a:rPr lang="fr-FR" dirty="0"/>
@@ -7341,7 +7482,7 @@
 </p:sld>
 </file>
 
-<file path=ppt/slides/slide17.xml><?xml version="1.0" encoding="utf-8"?>
+<file path=ppt/slides/slide18.xml><?xml version="1.0" encoding="utf-8"?>
 <p:sld xmlns:a="http://schemas.openxmlformats.org/drawingml/2006/main" xmlns:r="http://schemas.openxmlformats.org/officeDocument/2006/relationships" xmlns:p="http://schemas.openxmlformats.org/presentationml/2006/main">
   <p:cSld>
     <p:spTree>
@@ -7573,8 +7714,12 @@
           <a:p>
             <a:pPr algn="ctr"/>
             <a:r>
-              <a:rPr lang="fr-FR" sz="1400" dirty="0"/>
-              <a:t>Monogrammes, normalisé</a:t>
+              <a:rPr lang="fr-FR" sz="1400" dirty="0" err="1"/>
+              <a:t>unigrammes</a:t>
+            </a:r>
+            <a:r>
+              <a:rPr lang="fr-FR" sz="1400" dirty="0"/>
+              <a:t>, normalisé</a:t>
             </a:r>
           </a:p>
         </p:txBody>
@@ -7592,7 +7737,7 @@
 </p:sld>
 </file>
 
-<file path=ppt/slides/slide18.xml><?xml version="1.0" encoding="utf-8"?>
+<file path=ppt/slides/slide19.xml><?xml version="1.0" encoding="utf-8"?>
 <p:sld xmlns:a="http://schemas.openxmlformats.org/drawingml/2006/main" xmlns:r="http://schemas.openxmlformats.org/officeDocument/2006/relationships" xmlns:p="http://schemas.openxmlformats.org/presentationml/2006/main">
   <p:cSld>
     <p:spTree>
@@ -7667,7 +7812,7 @@
           <a:p>
             <a:r>
               <a:rPr lang="fr-FR" dirty="0"/>
-              <a:t>L’algorithme supervisé a été optimisé par l’utilisation de </a:t>
+              <a:t>L’algorithme supervisé SVM Multi-labels a été optimisé par l’utilisation de </a:t>
             </a:r>
             <a:r>
               <a:rPr lang="fr-FR" dirty="0" err="1"/>
@@ -7675,15 +7820,59 @@
             </a:r>
             <a:r>
               <a:rPr lang="fr-FR" dirty="0"/>
-              <a:t> au lieu de monogrammes</a:t>
-            </a:r>
+              <a:t> en plus des </a:t>
+            </a:r>
+            <a:r>
+              <a:rPr lang="fr-FR" dirty="0" err="1"/>
+              <a:t>unigrammes</a:t>
+            </a:r>
+            <a:endParaRPr lang="fr-FR" dirty="0"/>
           </a:p>
           <a:p>
             <a:pPr lvl="1"/>
             <a:r>
               <a:rPr lang="fr-FR" dirty="0"/>
-              <a:t>L’amélioration est de 4 à 6 points</a:t>
-            </a:r>
+              <a:t>L’amélioration est de 4 à 6 points. Elle est tout à fait intéressante avec cet algorithme.</a:t>
+            </a:r>
+          </a:p>
+          <a:p>
+            <a:pPr lvl="1"/>
+            <a:endParaRPr lang="fr-FR" dirty="0"/>
+          </a:p>
+          <a:p>
+            <a:pPr lvl="1"/>
+            <a:endParaRPr lang="fr-FR" dirty="0"/>
+          </a:p>
+          <a:p>
+            <a:pPr lvl="1"/>
+            <a:endParaRPr lang="fr-FR" dirty="0"/>
+          </a:p>
+          <a:p>
+            <a:pPr lvl="1"/>
+            <a:endParaRPr lang="fr-FR" dirty="0"/>
+          </a:p>
+          <a:p>
+            <a:pPr lvl="1"/>
+            <a:endParaRPr lang="fr-FR" dirty="0"/>
+          </a:p>
+          <a:p>
+            <a:r>
+              <a:rPr lang="fr-FR" dirty="0"/>
+              <a:t>Cet algorithme est très long à entraîner (plusieurs heures comparé à LDA qui prend quelques minutes) avec 15000 échantillons et 25000 </a:t>
+            </a:r>
+            <a:r>
+              <a:rPr lang="fr-FR" dirty="0" err="1"/>
+              <a:t>unigrammes</a:t>
+            </a:r>
+            <a:r>
+              <a:rPr lang="fr-FR" dirty="0"/>
+              <a:t> + </a:t>
+            </a:r>
+            <a:r>
+              <a:rPr lang="fr-FR" dirty="0" err="1"/>
+              <a:t>bigrammes</a:t>
+            </a:r>
+            <a:endParaRPr lang="fr-FR" dirty="0"/>
           </a:p>
         </p:txBody>
       </p:sp>
@@ -7702,13 +7891,13 @@
           <p:nvPr>
             <p:extLst>
               <p:ext uri="{D42A27DB-BD31-4B8C-83A1-F6EECF244321}">
-                <p14:modId xmlns:p14="http://schemas.microsoft.com/office/powerpoint/2010/main" val="3970323102"/>
+                <p14:modId xmlns:p14="http://schemas.microsoft.com/office/powerpoint/2010/main" val="2789826353"/>
               </p:ext>
             </p:extLst>
           </p:nvPr>
         </p:nvGraphicFramePr>
         <p:xfrm>
-          <a:off x="641797" y="3221507"/>
+          <a:off x="1504682" y="2512536"/>
           <a:ext cx="8092118" cy="1112520"/>
         </p:xfrm>
         <a:graphic>
@@ -7790,9 +7979,10 @@
                     <a:lstStyle/>
                     <a:p>
                       <a:r>
-                        <a:rPr lang="fr-FR" dirty="0"/>
-                        <a:t>Monogrammes</a:t>
+                        <a:rPr lang="fr-FR" dirty="0" err="1"/>
+                        <a:t>unigrammes</a:t>
                       </a:r>
+                      <a:endParaRPr lang="fr-FR" dirty="0"/>
                     </a:p>
                   </a:txBody>
                   <a:tcPr/>
@@ -7837,7 +8027,15 @@
                     <a:p>
                       <a:r>
                         <a:rPr lang="fr-FR" dirty="0" err="1"/>
-                        <a:t>Bigrammes</a:t>
+                        <a:t>unigrammes</a:t>
+                      </a:r>
+                      <a:r>
+                        <a:rPr lang="fr-FR" dirty="0"/>
+                        <a:t> + </a:t>
+                      </a:r>
+                      <a:r>
+                        <a:rPr lang="fr-FR" dirty="0" err="1"/>
+                        <a:t>bigrammes</a:t>
                       </a:r>
                       <a:endParaRPr lang="fr-FR" dirty="0"/>
                     </a:p>
@@ -7893,135 +8091,6 @@
 </p:sld>
 </file>
 
-<file path=ppt/slides/slide19.xml><?xml version="1.0" encoding="utf-8"?>
-<p:sld xmlns:a="http://schemas.openxmlformats.org/drawingml/2006/main" xmlns:r="http://schemas.openxmlformats.org/officeDocument/2006/relationships" xmlns:p="http://schemas.openxmlformats.org/presentationml/2006/main">
-  <p:cSld>
-    <p:spTree>
-      <p:nvGrpSpPr>
-        <p:cNvPr id="1" name=""/>
-        <p:cNvGrpSpPr/>
-        <p:nvPr/>
-      </p:nvGrpSpPr>
-      <p:grpSpPr>
-        <a:xfrm>
-          <a:off x="0" y="0"/>
-          <a:ext cx="0" cy="0"/>
-          <a:chOff x="0" y="0"/>
-          <a:chExt cx="0" cy="0"/>
-        </a:xfrm>
-      </p:grpSpPr>
-      <p:sp>
-        <p:nvSpPr>
-          <p:cNvPr id="2" name="Titre 1">
-            <a:extLst>
-              <a:ext uri="{FF2B5EF4-FFF2-40B4-BE49-F238E27FC236}">
-                <a16:creationId xmlns:a16="http://schemas.microsoft.com/office/drawing/2014/main" id="{36CFCD8D-DD1D-43E6-908F-6A737C1C0A51}"/>
-              </a:ext>
-            </a:extLst>
-          </p:cNvPr>
-          <p:cNvSpPr>
-            <a:spLocks noGrp="1"/>
-          </p:cNvSpPr>
-          <p:nvPr>
-            <p:ph type="title"/>
-          </p:nvPr>
-        </p:nvSpPr>
-        <p:spPr/>
-        <p:txBody>
-          <a:bodyPr/>
-          <a:lstStyle/>
-          <a:p>
-            <a:r>
-              <a:rPr lang="fr-FR" dirty="0"/>
-              <a:t>5. API de classification automatique</a:t>
-            </a:r>
-            <a:br>
-              <a:rPr lang="fr-FR" dirty="0"/>
-            </a:br>
-            <a:r>
-              <a:rPr lang="fr-FR" dirty="0"/>
-              <a:t>Description</a:t>
-            </a:r>
-          </a:p>
-        </p:txBody>
-      </p:sp>
-      <p:sp>
-        <p:nvSpPr>
-          <p:cNvPr id="3" name="Espace réservé du contenu 2">
-            <a:extLst>
-              <a:ext uri="{FF2B5EF4-FFF2-40B4-BE49-F238E27FC236}">
-                <a16:creationId xmlns:a16="http://schemas.microsoft.com/office/drawing/2014/main" id="{48BDE116-C35A-4DE3-82E3-3B0B01FB21B5}"/>
-              </a:ext>
-            </a:extLst>
-          </p:cNvPr>
-          <p:cNvSpPr>
-            <a:spLocks noGrp="1"/>
-          </p:cNvSpPr>
-          <p:nvPr>
-            <p:ph idx="1"/>
-          </p:nvPr>
-        </p:nvSpPr>
-        <p:spPr/>
-        <p:txBody>
-          <a:bodyPr/>
-          <a:lstStyle/>
-          <a:p>
-            <a:r>
-              <a:rPr lang="fr-FR" dirty="0"/>
-              <a:t>L’API prend en entrée :</a:t>
-            </a:r>
-          </a:p>
-          <a:p>
-            <a:pPr lvl="1"/>
-            <a:r>
-              <a:rPr lang="fr-FR" dirty="0"/>
-              <a:t>Le titre de la question</a:t>
-            </a:r>
-          </a:p>
-          <a:p>
-            <a:pPr lvl="1"/>
-            <a:r>
-              <a:rPr lang="fr-FR" dirty="0"/>
-              <a:t>Le corps ou description de la question</a:t>
-            </a:r>
-          </a:p>
-          <a:p>
-            <a:pPr lvl="1"/>
-            <a:r>
-              <a:rPr lang="fr-FR" dirty="0"/>
-              <a:t>L’implémentation utilise un POST sur un point d’accès, avec passage des contenus par éléments de formulaire.</a:t>
-            </a:r>
-          </a:p>
-          <a:p>
-            <a:r>
-              <a:rPr lang="fr-FR" dirty="0"/>
-              <a:t>Le classifieur SVM multi-classes entraîné sur les « anciennes » questions est utilisé pour prédire la probabilité de pertinence de chaque tag.</a:t>
-            </a:r>
-          </a:p>
-          <a:p>
-            <a:r>
-              <a:rPr lang="fr-FR" dirty="0"/>
-              <a:t>Elle retourne en sortie une liste de 10 tags parmi lesquels l’utilisateur est invité à faire son choix.</a:t>
-            </a:r>
-          </a:p>
-          <a:p>
-            <a:endParaRPr lang="fr-FR" dirty="0"/>
-          </a:p>
-        </p:txBody>
-      </p:sp>
-    </p:spTree>
-    <p:extLst>
-      <p:ext uri="{BB962C8B-B14F-4D97-AF65-F5344CB8AC3E}">
-        <p14:creationId xmlns:p14="http://schemas.microsoft.com/office/powerpoint/2010/main" val="3764843501"/>
-      </p:ext>
-    </p:extLst>
-  </p:cSld>
-  <p:clrMapOvr>
-    <a:masterClrMapping/>
-  </p:clrMapOvr>
-</p:sld>
-</file>
-
 <file path=ppt/slides/slide2.xml><?xml version="1.0" encoding="utf-8"?>
 <p:sld xmlns:a="http://schemas.openxmlformats.org/drawingml/2006/main" xmlns:r="http://schemas.openxmlformats.org/officeDocument/2006/relationships" xmlns:p="http://schemas.openxmlformats.org/presentationml/2006/main">
   <p:cSld>
@@ -8169,6 +8238,124 @@
           <p:cNvPr id="2" name="Titre 1">
             <a:extLst>
               <a:ext uri="{FF2B5EF4-FFF2-40B4-BE49-F238E27FC236}">
+                <a16:creationId xmlns:a16="http://schemas.microsoft.com/office/drawing/2014/main" id="{E9292D84-6829-4F96-A159-D1BAF47346CE}"/>
+              </a:ext>
+            </a:extLst>
+          </p:cNvPr>
+          <p:cNvSpPr>
+            <a:spLocks noGrp="1"/>
+          </p:cNvSpPr>
+          <p:nvPr>
+            <p:ph type="title"/>
+          </p:nvPr>
+        </p:nvSpPr>
+        <p:spPr/>
+        <p:txBody>
+          <a:bodyPr/>
+          <a:lstStyle/>
+          <a:p>
+            <a:r>
+              <a:rPr lang="fr-FR" dirty="0"/>
+              <a:t>Conclusion</a:t>
+            </a:r>
+          </a:p>
+        </p:txBody>
+      </p:sp>
+      <p:sp>
+        <p:nvSpPr>
+          <p:cNvPr id="3" name="Espace réservé du contenu 2">
+            <a:extLst>
+              <a:ext uri="{FF2B5EF4-FFF2-40B4-BE49-F238E27FC236}">
+                <a16:creationId xmlns:a16="http://schemas.microsoft.com/office/drawing/2014/main" id="{05AEA4F7-994B-4AD7-AECD-91564B70F254}"/>
+              </a:ext>
+            </a:extLst>
+          </p:cNvPr>
+          <p:cNvSpPr>
+            <a:spLocks noGrp="1"/>
+          </p:cNvSpPr>
+          <p:nvPr>
+            <p:ph idx="1"/>
+          </p:nvPr>
+        </p:nvSpPr>
+        <p:spPr/>
+        <p:txBody>
+          <a:bodyPr/>
+          <a:lstStyle/>
+          <a:p>
+            <a:r>
+              <a:rPr lang="fr-FR" dirty="0"/>
+              <a:t>L’algorithme supervisé donne de bien meilleurs résultats (70%) que l’algorithme non supervisé (40%).</a:t>
+            </a:r>
+          </a:p>
+          <a:p>
+            <a:r>
+              <a:rPr lang="fr-FR" dirty="0"/>
+              <a:t>L’algorithme supervisé est très long à entraîner</a:t>
+            </a:r>
+          </a:p>
+          <a:p>
+            <a:pPr lvl="1"/>
+            <a:r>
+              <a:rPr lang="fr-FR" dirty="0"/>
+              <a:t>cela peut être fait en tâche de fond et ne pénalisera pas l’utilisateur.</a:t>
+            </a:r>
+          </a:p>
+          <a:p>
+            <a:pPr lvl="1"/>
+            <a:r>
+              <a:rPr lang="fr-FR" dirty="0"/>
+              <a:t>La prédiction est suffisamment rapide pour être utilisée sur un site internet interactif.</a:t>
+            </a:r>
+          </a:p>
+          <a:p>
+            <a:r>
+              <a:rPr lang="fr-FR" dirty="0"/>
+              <a:t>Le niveau de performance obtenu limite cet algorithme à de la suggestion de tags. Une classification entièrement automatique, sans intervention humaine, ne serait pas satisfaisante.</a:t>
+            </a:r>
+          </a:p>
+          <a:p>
+            <a:r>
+              <a:rPr lang="fr-FR" dirty="0"/>
+              <a:t>Une limitation est que les tags proposés sont choisis dans l’ensemble des tags existants. De nouveaux tags, relatifs à de nouvelles technologies par exemple, ne seront pas proposés.</a:t>
+            </a:r>
+          </a:p>
+        </p:txBody>
+      </p:sp>
+    </p:spTree>
+    <p:extLst>
+      <p:ext uri="{BB962C8B-B14F-4D97-AF65-F5344CB8AC3E}">
+        <p14:creationId xmlns:p14="http://schemas.microsoft.com/office/powerpoint/2010/main" val="1141754230"/>
+      </p:ext>
+    </p:extLst>
+  </p:cSld>
+  <p:clrMapOvr>
+    <a:masterClrMapping/>
+  </p:clrMapOvr>
+</p:sld>
+</file>
+
+<file path=ppt/slides/slide21.xml><?xml version="1.0" encoding="utf-8"?>
+<p:sld xmlns:a="http://schemas.openxmlformats.org/drawingml/2006/main" xmlns:r="http://schemas.openxmlformats.org/officeDocument/2006/relationships" xmlns:p="http://schemas.openxmlformats.org/presentationml/2006/main">
+  <p:cSld>
+    <p:spTree>
+      <p:nvGrpSpPr>
+        <p:cNvPr id="1" name=""/>
+        <p:cNvGrpSpPr/>
+        <p:nvPr/>
+      </p:nvGrpSpPr>
+      <p:grpSpPr>
+        <a:xfrm>
+          <a:off x="0" y="0"/>
+          <a:ext cx="0" cy="0"/>
+          <a:chOff x="0" y="0"/>
+          <a:chExt cx="0" cy="0"/>
+        </a:xfrm>
+      </p:grpSpPr>
+      <p:sp>
+        <p:nvSpPr>
+          <p:cNvPr id="2" name="Titre 1">
+            <a:extLst>
+              <a:ext uri="{FF2B5EF4-FFF2-40B4-BE49-F238E27FC236}">
                 <a16:creationId xmlns:a16="http://schemas.microsoft.com/office/drawing/2014/main" id="{36CFCD8D-DD1D-43E6-908F-6A737C1C0A51}"/>
               </a:ext>
             </a:extLst>
@@ -8194,7 +8381,7 @@
             </a:br>
             <a:r>
               <a:rPr lang="fr-FR" dirty="0"/>
-              <a:t>Site de test</a:t>
+              <a:t>Description</a:t>
             </a:r>
           </a:p>
         </p:txBody>
@@ -8222,6 +8409,142 @@
           <a:p>
             <a:r>
               <a:rPr lang="fr-FR" dirty="0"/>
+              <a:t>L’API prend en entrée :</a:t>
+            </a:r>
+          </a:p>
+          <a:p>
+            <a:pPr lvl="1"/>
+            <a:r>
+              <a:rPr lang="fr-FR" dirty="0"/>
+              <a:t>Le titre de la question</a:t>
+            </a:r>
+          </a:p>
+          <a:p>
+            <a:pPr lvl="1"/>
+            <a:r>
+              <a:rPr lang="fr-FR" dirty="0"/>
+              <a:t>Le corps ou description de la question</a:t>
+            </a:r>
+          </a:p>
+          <a:p>
+            <a:pPr lvl="1"/>
+            <a:r>
+              <a:rPr lang="fr-FR" dirty="0"/>
+              <a:t>L’implémentation utilise un POST sur un point d’accès REST, avec passage des contenus par éléments de formulaire.</a:t>
+            </a:r>
+          </a:p>
+          <a:p>
+            <a:r>
+              <a:rPr lang="fr-FR" dirty="0"/>
+              <a:t>Le classifieur SVM multi-label entraîné sur les « anciennes » questions est utilisé pour prédire la probabilité de pertinence de chaque tag.</a:t>
+            </a:r>
+          </a:p>
+          <a:p>
+            <a:r>
+              <a:rPr lang="fr-FR" dirty="0"/>
+              <a:t>Elle retourne en sortie une liste de 5 tags parmi lesquels l’utilisateur est invité à faire son choix.</a:t>
+            </a:r>
+          </a:p>
+          <a:p>
+            <a:pPr lvl="1"/>
+            <a:r>
+              <a:rPr lang="fr-FR" dirty="0"/>
+              <a:t>Les tags ayant une probabilité supérieure à 50% sont affichés en gras.</a:t>
+            </a:r>
+          </a:p>
+          <a:p>
+            <a:endParaRPr lang="fr-FR" dirty="0"/>
+          </a:p>
+        </p:txBody>
+      </p:sp>
+    </p:spTree>
+    <p:extLst>
+      <p:ext uri="{BB962C8B-B14F-4D97-AF65-F5344CB8AC3E}">
+        <p14:creationId xmlns:p14="http://schemas.microsoft.com/office/powerpoint/2010/main" val="3764843501"/>
+      </p:ext>
+    </p:extLst>
+  </p:cSld>
+  <p:clrMapOvr>
+    <a:masterClrMapping/>
+  </p:clrMapOvr>
+</p:sld>
+</file>
+
+<file path=ppt/slides/slide22.xml><?xml version="1.0" encoding="utf-8"?>
+<p:sld xmlns:a="http://schemas.openxmlformats.org/drawingml/2006/main" xmlns:r="http://schemas.openxmlformats.org/officeDocument/2006/relationships" xmlns:p="http://schemas.openxmlformats.org/presentationml/2006/main">
+  <p:cSld>
+    <p:spTree>
+      <p:nvGrpSpPr>
+        <p:cNvPr id="1" name=""/>
+        <p:cNvGrpSpPr/>
+        <p:nvPr/>
+      </p:nvGrpSpPr>
+      <p:grpSpPr>
+        <a:xfrm>
+          <a:off x="0" y="0"/>
+          <a:ext cx="0" cy="0"/>
+          <a:chOff x="0" y="0"/>
+          <a:chExt cx="0" cy="0"/>
+        </a:xfrm>
+      </p:grpSpPr>
+      <p:sp>
+        <p:nvSpPr>
+          <p:cNvPr id="2" name="Titre 1">
+            <a:extLst>
+              <a:ext uri="{FF2B5EF4-FFF2-40B4-BE49-F238E27FC236}">
+                <a16:creationId xmlns:a16="http://schemas.microsoft.com/office/drawing/2014/main" id="{36CFCD8D-DD1D-43E6-908F-6A737C1C0A51}"/>
+              </a:ext>
+            </a:extLst>
+          </p:cNvPr>
+          <p:cNvSpPr>
+            <a:spLocks noGrp="1"/>
+          </p:cNvSpPr>
+          <p:nvPr>
+            <p:ph type="title"/>
+          </p:nvPr>
+        </p:nvSpPr>
+        <p:spPr/>
+        <p:txBody>
+          <a:bodyPr/>
+          <a:lstStyle/>
+          <a:p>
+            <a:r>
+              <a:rPr lang="fr-FR" dirty="0"/>
+              <a:t>5. API de classification automatique</a:t>
+            </a:r>
+            <a:br>
+              <a:rPr lang="fr-FR" dirty="0"/>
+            </a:br>
+            <a:r>
+              <a:rPr lang="fr-FR" dirty="0"/>
+              <a:t>Site de test</a:t>
+            </a:r>
+          </a:p>
+        </p:txBody>
+      </p:sp>
+      <p:sp>
+        <p:nvSpPr>
+          <p:cNvPr id="3" name="Espace réservé du contenu 2">
+            <a:extLst>
+              <a:ext uri="{FF2B5EF4-FFF2-40B4-BE49-F238E27FC236}">
+                <a16:creationId xmlns:a16="http://schemas.microsoft.com/office/drawing/2014/main" id="{48BDE116-C35A-4DE3-82E3-3B0B01FB21B5}"/>
+              </a:ext>
+            </a:extLst>
+          </p:cNvPr>
+          <p:cNvSpPr>
+            <a:spLocks noGrp="1"/>
+          </p:cNvSpPr>
+          <p:nvPr>
+            <p:ph idx="1"/>
+          </p:nvPr>
+        </p:nvSpPr>
+        <p:spPr/>
+        <p:txBody>
+          <a:bodyPr/>
+          <a:lstStyle/>
+          <a:p>
+            <a:r>
+              <a:rPr lang="fr-FR" dirty="0"/>
               <a:t>Le formulaire permettant de saisir une question est disponible à l’adresse</a:t>
             </a:r>
             <a:br>
@@ -8254,8 +8577,36 @@
             </a:r>
             <a:r>
               <a:rPr lang="fr-FR" dirty="0"/>
-              <a:t> en lui passant le titre et le corps de la question et propose en retour une liste de 10 tags.</a:t>
-            </a:r>
+              <a:t> en lui passant le titre et le corps de la question et propose en retour une liste de 5 tags.</a:t>
+            </a:r>
+          </a:p>
+          <a:p>
+            <a:endParaRPr lang="fr-FR" dirty="0"/>
+          </a:p>
+          <a:p>
+            <a:endParaRPr lang="fr-FR" dirty="0"/>
+          </a:p>
+          <a:p>
+            <a:endParaRPr lang="fr-FR" dirty="0"/>
+          </a:p>
+          <a:p>
+            <a:endParaRPr lang="fr-FR" dirty="0"/>
+          </a:p>
+          <a:p>
+            <a:endParaRPr lang="fr-FR" dirty="0"/>
+          </a:p>
+          <a:p>
+            <a:r>
+              <a:rPr lang="fr-FR" dirty="0"/>
+              <a:t>Note : une page d’accueil donnant les points d’entrée des autres API de ce parcours est disponible à </a:t>
+            </a:r>
+            <a:r>
+              <a:rPr lang="fr-FR" dirty="0">
+                <a:hlinkClick r:id="rId2"/>
+              </a:rPr>
+              <a:t>http://muths.pythonanywhere.com</a:t>
+            </a:r>
+            <a:endParaRPr lang="fr-FR" dirty="0"/>
           </a:p>
         </p:txBody>
       </p:sp>
@@ -8272,7 +8623,7 @@
 </p:sld>
 </file>
 
-<file path=ppt/slides/slide21.xml><?xml version="1.0" encoding="utf-8"?>
+<file path=ppt/slides/slide23.xml><?xml version="1.0" encoding="utf-8"?>
 <p:sld xmlns:a="http://schemas.openxmlformats.org/drawingml/2006/main" xmlns:r="http://schemas.openxmlformats.org/officeDocument/2006/relationships" xmlns:p="http://schemas.openxmlformats.org/presentationml/2006/main">
   <p:cSld>
     <p:spTree>
@@ -8928,7 +9279,30 @@
           <a:p>
             <a:r>
               <a:rPr lang="fr-FR" dirty="0"/>
-              <a:t>Un jeu de questions issu du site stackoverflow.com est utilisé pour entraîner un modèle.</a:t>
+              <a:t>Un jeu de questions issu du site stackoverflow.com est utilisé pour entraîner un modèle :</a:t>
+            </a:r>
+          </a:p>
+          <a:p>
+            <a:pPr lvl="1"/>
+            <a:r>
+              <a:rPr lang="fr-FR" dirty="0"/>
+              <a:t>Toutes les questions avec un score supérieur à 100 ayant eu une activité entre le 1</a:t>
+            </a:r>
+            <a:r>
+              <a:rPr lang="fr-FR" baseline="30000" dirty="0"/>
+              <a:t>er</a:t>
+            </a:r>
+            <a:r>
+              <a:rPr lang="fr-FR" dirty="0"/>
+              <a:t> avril 2017 et le 1</a:t>
+            </a:r>
+            <a:r>
+              <a:rPr lang="fr-FR" baseline="30000" dirty="0"/>
+              <a:t>er</a:t>
+            </a:r>
+            <a:r>
+              <a:rPr lang="fr-FR" dirty="0"/>
+              <a:t>  avril 2018</a:t>
             </a:r>
           </a:p>
           <a:p>
@@ -8954,7 +9328,7 @@
             <a:pPr lvl="1"/>
             <a:r>
               <a:rPr lang="fr-FR" dirty="0"/>
-              <a:t>Une méthode supervisée (SVC multi-classes) a été mise en œuvre</a:t>
+              <a:t>Une méthode supervisée (SVC multi-labels) a été mise en œuvre pour prédire une probabilité d’appartenance d’une question à un tag, et proposer une liste de tags les plus probables.</a:t>
             </a:r>
           </a:p>
           <a:p>
@@ -8962,6 +9336,25 @@
               <a:rPr lang="fr-FR" dirty="0"/>
               <a:t>La mesure de performance, commune aux deux méthodes, est le taux de « bons » tags, autrement dit, la proportion des tags alloués par l’utilisateur qui font partie des tags proposés.</a:t>
             </a:r>
+          </a:p>
+          <a:p>
+            <a:pPr lvl="1"/>
+            <a:r>
+              <a:rPr lang="fr-FR" dirty="0"/>
+              <a:t>Cette mesure est effectuée sur un jeu de test constitué de questions ayant eu une activité après le 1</a:t>
+            </a:r>
+            <a:r>
+              <a:rPr lang="fr-FR" baseline="30000" dirty="0"/>
+              <a:t>er</a:t>
+            </a:r>
+            <a:r>
+              <a:rPr lang="fr-FR" dirty="0"/>
+              <a:t> avril 2018</a:t>
+            </a:r>
+          </a:p>
+          <a:p>
+            <a:pPr lvl="1"/>
+            <a:endParaRPr lang="fr-FR" dirty="0"/>
           </a:p>
           <a:p>
             <a:pPr lvl="2"/>
@@ -9053,7 +9446,7 @@
           <a:p>
             <a:r>
               <a:rPr lang="fr-FR" dirty="0"/>
-              <a:t>Le jeu de données d’entrainement consiste en 15089 questions (ensemble des questions dont la date de dernière activité est sur une période d’un an).</a:t>
+              <a:t>Le jeu de données d’entrainement consiste en 15089 questions.</a:t>
             </a:r>
           </a:p>
           <a:p>
@@ -10017,32 +10410,39 @@
             <a:pPr lvl="1"/>
             <a:r>
               <a:rPr lang="fr-FR" dirty="0"/>
-              <a:t>Le choix s’est arrêté sur 15 topics. A la lecture des termes proposés, ces topics sont assez bien caractérisés.</a:t>
-            </a:r>
-          </a:p>
-          <a:p>
-            <a:pPr lvl="2"/>
-            <a:r>
-              <a:rPr lang="en-US" dirty="0"/>
-              <a:t>Best score: 0.2898 with 43 topics </a:t>
-            </a:r>
-            <a:r>
-              <a:rPr lang="en-US"/>
-              <a:t>(avec normalization </a:t>
-            </a:r>
-            <a:r>
-              <a:rPr lang="en-US" dirty="0"/>
-              <a:t>du </a:t>
-            </a:r>
-            <a:r>
-              <a:rPr lang="en-US" dirty="0" err="1"/>
-              <a:t>poids</a:t>
-            </a:r>
-            <a:r>
-              <a:rPr lang="en-US" dirty="0"/>
-              <a:t> des tags)</a:t>
-            </a:r>
+              <a:t>Une mesure de performance spécifique à ce cas d’emploi a été utilisée.</a:t>
+            </a:r>
+          </a:p>
+          <a:p>
+            <a:pPr lvl="1"/>
+            <a:r>
+              <a:rPr lang="fr-FR" dirty="0"/>
+              <a:t>Une recherche du nombre de topics optimisant le résultat a été faite.</a:t>
+            </a:r>
+          </a:p>
+          <a:p>
+            <a:pPr lvl="1"/>
             <a:endParaRPr lang="fr-FR" dirty="0"/>
+          </a:p>
+          <a:p>
+            <a:pPr lvl="1"/>
+            <a:endParaRPr lang="fr-FR" dirty="0"/>
+          </a:p>
+          <a:p>
+            <a:pPr marL="114300" lvl="1" indent="0">
+              <a:buNone/>
+            </a:pPr>
+            <a:r>
+              <a:rPr lang="fr-FR" dirty="0"/>
+              <a:t>Slide suivant :</a:t>
+            </a:r>
+          </a:p>
+          <a:p>
+            <a:pPr lvl="1"/>
+            <a:r>
+              <a:rPr lang="fr-FR" dirty="0"/>
+              <a:t>Exemple avec 15 topics. A la lecture des termes proposés, ces topics sont assez bien caractérisés.</a:t>
+            </a:r>
           </a:p>
         </p:txBody>
       </p:sp>
@@ -11227,12 +11627,17 @@
 </file>
 
 <file path=customXml/item1.xml><?xml version="1.0" encoding="utf-8"?>
-<?mso-contentType ?>
-<FormTemplates xmlns="http://schemas.microsoft.com/sharepoint/v3/contenttype/forms">
-  <Display>DocumentLibraryForm</Display>
-  <Edit>DocumentLibraryForm</Edit>
-  <New>DocumentLibraryForm</New>
-</FormTemplates>
+<p:properties xmlns:p="http://schemas.microsoft.com/office/2006/metadata/properties" xmlns:xsi="http://www.w3.org/2001/XMLSchema-instance" xmlns:pc="http://schemas.microsoft.com/office/infopath/2007/PartnerControls">
+  <documentManagement>
+    <SharedWithUsers xmlns="748099ad-2d26-4e61-9061-59d3c097668b">
+      <UserInfo>
+        <DisplayName>Vallier Joel</DisplayName>
+        <AccountId>257</AccountId>
+        <AccountType/>
+      </UserInfo>
+    </SharedWithUsers>
+  </documentManagement>
+</p:properties>
 </file>
 
 <file path=customXml/item2.xml><?xml version="1.0" encoding="utf-8"?>
@@ -11401,23 +11806,27 @@
 </file>
 
 <file path=customXml/item3.xml><?xml version="1.0" encoding="utf-8"?>
-<p:properties xmlns:p="http://schemas.microsoft.com/office/2006/metadata/properties" xmlns:xsi="http://www.w3.org/2001/XMLSchema-instance" xmlns:pc="http://schemas.microsoft.com/office/infopath/2007/PartnerControls">
-  <documentManagement>
-    <SharedWithUsers xmlns="748099ad-2d26-4e61-9061-59d3c097668b">
-      <UserInfo>
-        <DisplayName>Vallier Joel</DisplayName>
-        <AccountId>257</AccountId>
-        <AccountType/>
-      </UserInfo>
-    </SharedWithUsers>
-  </documentManagement>
-</p:properties>
+<?mso-contentType ?>
+<FormTemplates xmlns="http://schemas.microsoft.com/sharepoint/v3/contenttype/forms">
+  <Display>DocumentLibraryForm</Display>
+  <Edit>DocumentLibraryForm</Edit>
+  <New>DocumentLibraryForm</New>
+</FormTemplates>
 </file>
 
 <file path=customXml/itemProps1.xml><?xml version="1.0" encoding="utf-8"?>
-<ds:datastoreItem xmlns:ds="http://schemas.openxmlformats.org/officeDocument/2006/customXml" ds:itemID="{39C1D1BA-6728-4495-AD47-2EC15D871705}">
+<ds:datastoreItem xmlns:ds="http://schemas.openxmlformats.org/officeDocument/2006/customXml" ds:itemID="{2E0D8ABF-D62B-43C1-8CD5-8FDE6B705449}">
   <ds:schemaRefs>
-    <ds:schemaRef ds:uri="http://schemas.microsoft.com/sharepoint/v3/contenttype/forms"/>
+    <ds:schemaRef ds:uri="242081e3-def4-49db-957a-142271ec8b9e"/>
+    <ds:schemaRef ds:uri="http://purl.org/dc/dcmitype/"/>
+    <ds:schemaRef ds:uri="http://purl.org/dc/elements/1.1/"/>
+    <ds:schemaRef ds:uri="http://www.w3.org/XML/1998/namespace"/>
+    <ds:schemaRef ds:uri="748099ad-2d26-4e61-9061-59d3c097668b"/>
+    <ds:schemaRef ds:uri="http://purl.org/dc/terms/"/>
+    <ds:schemaRef ds:uri="http://schemas.openxmlformats.org/package/2006/metadata/core-properties"/>
+    <ds:schemaRef ds:uri="http://schemas.microsoft.com/office/2006/documentManagement/types"/>
+    <ds:schemaRef ds:uri="http://schemas.microsoft.com/office/infopath/2007/PartnerControls"/>
+    <ds:schemaRef ds:uri="http://schemas.microsoft.com/office/2006/metadata/properties"/>
   </ds:schemaRefs>
 </ds:datastoreItem>
 </file>
@@ -11442,18 +11851,9 @@
 </file>
 
 <file path=customXml/itemProps3.xml><?xml version="1.0" encoding="utf-8"?>
-<ds:datastoreItem xmlns:ds="http://schemas.openxmlformats.org/officeDocument/2006/customXml" ds:itemID="{2E0D8ABF-D62B-43C1-8CD5-8FDE6B705449}">
+<ds:datastoreItem xmlns:ds="http://schemas.openxmlformats.org/officeDocument/2006/customXml" ds:itemID="{39C1D1BA-6728-4495-AD47-2EC15D871705}">
   <ds:schemaRefs>
-    <ds:schemaRef ds:uri="242081e3-def4-49db-957a-142271ec8b9e"/>
-    <ds:schemaRef ds:uri="http://purl.org/dc/dcmitype/"/>
-    <ds:schemaRef ds:uri="http://purl.org/dc/elements/1.1/"/>
-    <ds:schemaRef ds:uri="http://www.w3.org/XML/1998/namespace"/>
-    <ds:schemaRef ds:uri="748099ad-2d26-4e61-9061-59d3c097668b"/>
-    <ds:schemaRef ds:uri="http://purl.org/dc/terms/"/>
-    <ds:schemaRef ds:uri="http://schemas.openxmlformats.org/package/2006/metadata/core-properties"/>
-    <ds:schemaRef ds:uri="http://schemas.microsoft.com/office/2006/documentManagement/types"/>
-    <ds:schemaRef ds:uri="http://schemas.microsoft.com/office/infopath/2007/PartnerControls"/>
-    <ds:schemaRef ds:uri="http://schemas.microsoft.com/office/2006/metadata/properties"/>
+    <ds:schemaRef ds:uri="http://schemas.microsoft.com/sharepoint/v3/contenttype/forms"/>
   </ds:schemaRefs>
 </ds:datastoreItem>
 </file>

</xml_diff>